<commit_message>
added my slide in powerpoint
</commit_message>
<xml_diff>
--- a/New Features of Java 7 and 8.pptx
+++ b/New Features of Java 7 and 8.pptx
@@ -14,8 +14,13 @@
     <p:sldId id="266" r:id="rId8"/>
     <p:sldId id="260" r:id="rId9"/>
     <p:sldId id="261" r:id="rId10"/>
-    <p:sldId id="262" r:id="rId11"/>
-    <p:sldId id="263" r:id="rId12"/>
+    <p:sldId id="267" r:id="rId11"/>
+    <p:sldId id="268" r:id="rId12"/>
+    <p:sldId id="269" r:id="rId13"/>
+    <p:sldId id="270" r:id="rId14"/>
+    <p:sldId id="271" r:id="rId15"/>
+    <p:sldId id="262" r:id="rId16"/>
+    <p:sldId id="263" r:id="rId17"/>
   </p:sldIdLst>
   <p:sldSz cx="12192000" cy="6858000"/>
   <p:notesSz cx="6858000" cy="9144000"/>
@@ -6205,6 +6210,492 @@
           <a:p>
             <a:r>
               <a:rPr lang="en-US" dirty="0" smtClean="0"/>
+              <a:t>JavaScript inside Java 8</a:t>
+            </a:r>
+            <a:br>
+              <a:rPr lang="en-US" dirty="0" smtClean="0"/>
+            </a:br>
+            <a:endParaRPr lang="en-US" dirty="0"/>
+          </a:p>
+        </p:txBody>
+      </p:sp>
+      <p:sp>
+        <p:nvSpPr>
+          <p:cNvPr id="3" name="Content Placeholder 2"/>
+          <p:cNvSpPr>
+            <a:spLocks noGrp="1"/>
+          </p:cNvSpPr>
+          <p:nvPr>
+            <p:ph idx="1"/>
+          </p:nvPr>
+        </p:nvSpPr>
+        <p:spPr/>
+        <p:txBody>
+          <a:bodyPr/>
+          <a:lstStyle/>
+          <a:p>
+            <a:r>
+              <a:rPr lang="en-US" dirty="0" err="1"/>
+              <a:t>Nashorn</a:t>
+            </a:r>
+            <a:r>
+              <a:rPr lang="en-US" dirty="0"/>
+              <a:t> JavaScript </a:t>
+            </a:r>
+            <a:r>
+              <a:rPr lang="en-US" dirty="0" smtClean="0"/>
+              <a:t>engine</a:t>
+            </a:r>
+          </a:p>
+          <a:p>
+            <a:r>
+              <a:rPr lang="en-US" dirty="0" smtClean="0"/>
+              <a:t>Java &amp; JS interoperability</a:t>
+            </a:r>
+            <a:endParaRPr lang="en-US" dirty="0"/>
+          </a:p>
+          <a:p>
+            <a:endParaRPr lang="en-US" dirty="0"/>
+          </a:p>
+        </p:txBody>
+      </p:sp>
+    </p:spTree>
+    <p:extLst>
+      <p:ext uri="{BB962C8B-B14F-4D97-AF65-F5344CB8AC3E}">
+        <p14:creationId xmlns:p14="http://schemas.microsoft.com/office/powerpoint/2010/main" val="2119451415"/>
+      </p:ext>
+    </p:extLst>
+  </p:cSld>
+  <p:clrMapOvr>
+    <a:masterClrMapping/>
+  </p:clrMapOvr>
+</p:sld>
+</file>
+
+<file path=ppt/slides/slide11.xml><?xml version="1.0" encoding="utf-8"?>
+<p:sld xmlns:a="http://schemas.openxmlformats.org/drawingml/2006/main" xmlns:r="http://schemas.openxmlformats.org/officeDocument/2006/relationships" xmlns:p="http://schemas.openxmlformats.org/presentationml/2006/main">
+  <p:cSld>
+    <p:spTree>
+      <p:nvGrpSpPr>
+        <p:cNvPr id="1" name=""/>
+        <p:cNvGrpSpPr/>
+        <p:nvPr/>
+      </p:nvGrpSpPr>
+      <p:grpSpPr>
+        <a:xfrm>
+          <a:off x="0" y="0"/>
+          <a:ext cx="0" cy="0"/>
+          <a:chOff x="0" y="0"/>
+          <a:chExt cx="0" cy="0"/>
+        </a:xfrm>
+      </p:grpSpPr>
+      <p:sp>
+        <p:nvSpPr>
+          <p:cNvPr id="2" name="Title 1"/>
+          <p:cNvSpPr>
+            <a:spLocks noGrp="1"/>
+          </p:cNvSpPr>
+          <p:nvPr>
+            <p:ph type="title"/>
+          </p:nvPr>
+        </p:nvSpPr>
+        <p:spPr/>
+        <p:txBody>
+          <a:bodyPr/>
+          <a:lstStyle/>
+          <a:p>
+            <a:endParaRPr lang="en-US"/>
+          </a:p>
+        </p:txBody>
+      </p:sp>
+      <p:sp>
+        <p:nvSpPr>
+          <p:cNvPr id="3" name="Content Placeholder 2"/>
+          <p:cNvSpPr>
+            <a:spLocks noGrp="1"/>
+          </p:cNvSpPr>
+          <p:nvPr>
+            <p:ph idx="1"/>
+          </p:nvPr>
+        </p:nvSpPr>
+        <p:spPr/>
+        <p:txBody>
+          <a:bodyPr/>
+          <a:lstStyle/>
+          <a:p>
+            <a:endParaRPr lang="en-US" dirty="0"/>
+          </a:p>
+        </p:txBody>
+      </p:sp>
+      <p:pic>
+        <p:nvPicPr>
+          <p:cNvPr id="4" name="Picture 3"/>
+          <p:cNvPicPr>
+            <a:picLocks noChangeAspect="1"/>
+          </p:cNvPicPr>
+          <p:nvPr/>
+        </p:nvPicPr>
+        <p:blipFill>
+          <a:blip r:embed="rId2"/>
+          <a:stretch>
+            <a:fillRect/>
+          </a:stretch>
+        </p:blipFill>
+        <p:spPr>
+          <a:xfrm>
+            <a:off x="991675" y="1624745"/>
+            <a:ext cx="9878096" cy="1199299"/>
+          </a:xfrm>
+          <a:prstGeom prst="rect">
+            <a:avLst/>
+          </a:prstGeom>
+        </p:spPr>
+      </p:pic>
+      <p:pic>
+        <p:nvPicPr>
+          <p:cNvPr id="5" name="Picture 4"/>
+          <p:cNvPicPr>
+            <a:picLocks noChangeAspect="1"/>
+          </p:cNvPicPr>
+          <p:nvPr/>
+        </p:nvPicPr>
+        <p:blipFill>
+          <a:blip r:embed="rId3"/>
+          <a:stretch>
+            <a:fillRect/>
+          </a:stretch>
+        </p:blipFill>
+        <p:spPr>
+          <a:xfrm>
+            <a:off x="2075932" y="4517663"/>
+            <a:ext cx="6545080" cy="1406618"/>
+          </a:xfrm>
+          <a:prstGeom prst="rect">
+            <a:avLst/>
+          </a:prstGeom>
+        </p:spPr>
+      </p:pic>
+    </p:spTree>
+    <p:extLst>
+      <p:ext uri="{BB962C8B-B14F-4D97-AF65-F5344CB8AC3E}">
+        <p14:creationId xmlns:p14="http://schemas.microsoft.com/office/powerpoint/2010/main" val="3546777943"/>
+      </p:ext>
+    </p:extLst>
+  </p:cSld>
+  <p:clrMapOvr>
+    <a:masterClrMapping/>
+  </p:clrMapOvr>
+</p:sld>
+</file>
+
+<file path=ppt/slides/slide12.xml><?xml version="1.0" encoding="utf-8"?>
+<p:sld xmlns:a="http://schemas.openxmlformats.org/drawingml/2006/main" xmlns:r="http://schemas.openxmlformats.org/officeDocument/2006/relationships" xmlns:p="http://schemas.openxmlformats.org/presentationml/2006/main">
+  <p:cSld>
+    <p:spTree>
+      <p:nvGrpSpPr>
+        <p:cNvPr id="1" name=""/>
+        <p:cNvGrpSpPr/>
+        <p:nvPr/>
+      </p:nvGrpSpPr>
+      <p:grpSpPr>
+        <a:xfrm>
+          <a:off x="0" y="0"/>
+          <a:ext cx="0" cy="0"/>
+          <a:chOff x="0" y="0"/>
+          <a:chExt cx="0" cy="0"/>
+        </a:xfrm>
+      </p:grpSpPr>
+      <p:sp>
+        <p:nvSpPr>
+          <p:cNvPr id="2" name="Title 1"/>
+          <p:cNvSpPr>
+            <a:spLocks noGrp="1"/>
+          </p:cNvSpPr>
+          <p:nvPr>
+            <p:ph type="title"/>
+          </p:nvPr>
+        </p:nvSpPr>
+        <p:spPr/>
+        <p:txBody>
+          <a:bodyPr/>
+          <a:lstStyle/>
+          <a:p>
+            <a:r>
+              <a:rPr lang="en-US" dirty="0" smtClean="0"/>
+              <a:t>Base64</a:t>
+            </a:r>
+            <a:endParaRPr lang="en-US" dirty="0"/>
+          </a:p>
+        </p:txBody>
+      </p:sp>
+      <p:sp>
+        <p:nvSpPr>
+          <p:cNvPr id="3" name="Content Placeholder 2"/>
+          <p:cNvSpPr>
+            <a:spLocks noGrp="1"/>
+          </p:cNvSpPr>
+          <p:nvPr>
+            <p:ph idx="1"/>
+          </p:nvPr>
+        </p:nvSpPr>
+        <p:spPr/>
+        <p:txBody>
+          <a:bodyPr/>
+          <a:lstStyle/>
+          <a:p>
+            <a:r>
+              <a:rPr lang="en-US" dirty="0" smtClean="0"/>
+              <a:t>Encoding</a:t>
+            </a:r>
+          </a:p>
+          <a:p>
+            <a:r>
+              <a:rPr lang="en-US" dirty="0" smtClean="0"/>
+              <a:t>Decoding</a:t>
+            </a:r>
+          </a:p>
+          <a:p>
+            <a:r>
+              <a:rPr lang="en-US" dirty="0" smtClean="0"/>
+              <a:t>Java 8 inbuilt encoder &amp; decoder</a:t>
+            </a:r>
+          </a:p>
+          <a:p>
+            <a:endParaRPr lang="en-US" dirty="0"/>
+          </a:p>
+        </p:txBody>
+      </p:sp>
+    </p:spTree>
+    <p:extLst>
+      <p:ext uri="{BB962C8B-B14F-4D97-AF65-F5344CB8AC3E}">
+        <p14:creationId xmlns:p14="http://schemas.microsoft.com/office/powerpoint/2010/main" val="2818900"/>
+      </p:ext>
+    </p:extLst>
+  </p:cSld>
+  <p:clrMapOvr>
+    <a:masterClrMapping/>
+  </p:clrMapOvr>
+</p:sld>
+</file>
+
+<file path=ppt/slides/slide13.xml><?xml version="1.0" encoding="utf-8"?>
+<p:sld xmlns:a="http://schemas.openxmlformats.org/drawingml/2006/main" xmlns:r="http://schemas.openxmlformats.org/officeDocument/2006/relationships" xmlns:p="http://schemas.openxmlformats.org/presentationml/2006/main">
+  <p:cSld>
+    <p:spTree>
+      <p:nvGrpSpPr>
+        <p:cNvPr id="1" name=""/>
+        <p:cNvGrpSpPr/>
+        <p:nvPr/>
+      </p:nvGrpSpPr>
+      <p:grpSpPr>
+        <a:xfrm>
+          <a:off x="0" y="0"/>
+          <a:ext cx="0" cy="0"/>
+          <a:chOff x="0" y="0"/>
+          <a:chExt cx="0" cy="0"/>
+        </a:xfrm>
+      </p:grpSpPr>
+      <p:sp>
+        <p:nvSpPr>
+          <p:cNvPr id="2" name="Title 1"/>
+          <p:cNvSpPr>
+            <a:spLocks noGrp="1"/>
+          </p:cNvSpPr>
+          <p:nvPr>
+            <p:ph type="title"/>
+          </p:nvPr>
+        </p:nvSpPr>
+        <p:spPr/>
+        <p:txBody>
+          <a:bodyPr/>
+          <a:lstStyle/>
+          <a:p>
+            <a:endParaRPr lang="en-US" dirty="0"/>
+          </a:p>
+        </p:txBody>
+      </p:sp>
+      <p:sp>
+        <p:nvSpPr>
+          <p:cNvPr id="3" name="Content Placeholder 2"/>
+          <p:cNvSpPr>
+            <a:spLocks noGrp="1"/>
+          </p:cNvSpPr>
+          <p:nvPr>
+            <p:ph idx="1"/>
+          </p:nvPr>
+        </p:nvSpPr>
+        <p:spPr/>
+        <p:txBody>
+          <a:bodyPr/>
+          <a:lstStyle/>
+          <a:p>
+            <a:endParaRPr lang="en-US"/>
+          </a:p>
+        </p:txBody>
+      </p:sp>
+      <p:pic>
+        <p:nvPicPr>
+          <p:cNvPr id="4" name="Picture 3"/>
+          <p:cNvPicPr>
+            <a:picLocks noChangeAspect="1"/>
+          </p:cNvPicPr>
+          <p:nvPr/>
+        </p:nvPicPr>
+        <p:blipFill>
+          <a:blip r:embed="rId2"/>
+          <a:stretch>
+            <a:fillRect/>
+          </a:stretch>
+        </p:blipFill>
+        <p:spPr>
+          <a:xfrm>
+            <a:off x="1816975" y="1152983"/>
+            <a:ext cx="8414715" cy="4458639"/>
+          </a:xfrm>
+          <a:prstGeom prst="rect">
+            <a:avLst/>
+          </a:prstGeom>
+        </p:spPr>
+      </p:pic>
+    </p:spTree>
+    <p:extLst>
+      <p:ext uri="{BB962C8B-B14F-4D97-AF65-F5344CB8AC3E}">
+        <p14:creationId xmlns:p14="http://schemas.microsoft.com/office/powerpoint/2010/main" val="3151037798"/>
+      </p:ext>
+    </p:extLst>
+  </p:cSld>
+  <p:clrMapOvr>
+    <a:masterClrMapping/>
+  </p:clrMapOvr>
+</p:sld>
+</file>
+
+<file path=ppt/slides/slide14.xml><?xml version="1.0" encoding="utf-8"?>
+<p:sld xmlns:a="http://schemas.openxmlformats.org/drawingml/2006/main" xmlns:r="http://schemas.openxmlformats.org/officeDocument/2006/relationships" xmlns:p="http://schemas.openxmlformats.org/presentationml/2006/main">
+  <p:cSld>
+    <p:spTree>
+      <p:nvGrpSpPr>
+        <p:cNvPr id="1" name=""/>
+        <p:cNvGrpSpPr/>
+        <p:nvPr/>
+      </p:nvGrpSpPr>
+      <p:grpSpPr>
+        <a:xfrm>
+          <a:off x="0" y="0"/>
+          <a:ext cx="0" cy="0"/>
+          <a:chOff x="0" y="0"/>
+          <a:chExt cx="0" cy="0"/>
+        </a:xfrm>
+      </p:grpSpPr>
+      <p:sp>
+        <p:nvSpPr>
+          <p:cNvPr id="2" name="Title 1"/>
+          <p:cNvSpPr>
+            <a:spLocks noGrp="1"/>
+          </p:cNvSpPr>
+          <p:nvPr>
+            <p:ph type="title"/>
+          </p:nvPr>
+        </p:nvSpPr>
+        <p:spPr/>
+        <p:txBody>
+          <a:bodyPr/>
+          <a:lstStyle/>
+          <a:p>
+            <a:endParaRPr lang="en-US"/>
+          </a:p>
+        </p:txBody>
+      </p:sp>
+      <p:sp>
+        <p:nvSpPr>
+          <p:cNvPr id="3" name="Content Placeholder 2"/>
+          <p:cNvSpPr>
+            <a:spLocks noGrp="1"/>
+          </p:cNvSpPr>
+          <p:nvPr>
+            <p:ph idx="1"/>
+          </p:nvPr>
+        </p:nvSpPr>
+        <p:spPr/>
+        <p:txBody>
+          <a:bodyPr/>
+          <a:lstStyle/>
+          <a:p>
+            <a:endParaRPr lang="en-US"/>
+          </a:p>
+        </p:txBody>
+      </p:sp>
+      <p:pic>
+        <p:nvPicPr>
+          <p:cNvPr id="4" name="Picture 3"/>
+          <p:cNvPicPr>
+            <a:picLocks noChangeAspect="1"/>
+          </p:cNvPicPr>
+          <p:nvPr/>
+        </p:nvPicPr>
+        <p:blipFill>
+          <a:blip r:embed="rId2"/>
+          <a:stretch>
+            <a:fillRect/>
+          </a:stretch>
+        </p:blipFill>
+        <p:spPr>
+          <a:xfrm>
+            <a:off x="2906256" y="3087336"/>
+            <a:ext cx="5340651" cy="866478"/>
+          </a:xfrm>
+          <a:prstGeom prst="rect">
+            <a:avLst/>
+          </a:prstGeom>
+        </p:spPr>
+      </p:pic>
+    </p:spTree>
+    <p:extLst>
+      <p:ext uri="{BB962C8B-B14F-4D97-AF65-F5344CB8AC3E}">
+        <p14:creationId xmlns:p14="http://schemas.microsoft.com/office/powerpoint/2010/main" val="2236681727"/>
+      </p:ext>
+    </p:extLst>
+  </p:cSld>
+  <p:clrMapOvr>
+    <a:masterClrMapping/>
+  </p:clrMapOvr>
+</p:sld>
+</file>
+
+<file path=ppt/slides/slide15.xml><?xml version="1.0" encoding="utf-8"?>
+<p:sld xmlns:a="http://schemas.openxmlformats.org/drawingml/2006/main" xmlns:r="http://schemas.openxmlformats.org/officeDocument/2006/relationships" xmlns:p="http://schemas.openxmlformats.org/presentationml/2006/main">
+  <p:cSld>
+    <p:spTree>
+      <p:nvGrpSpPr>
+        <p:cNvPr id="1" name=""/>
+        <p:cNvGrpSpPr/>
+        <p:nvPr/>
+      </p:nvGrpSpPr>
+      <p:grpSpPr>
+        <a:xfrm>
+          <a:off x="0" y="0"/>
+          <a:ext cx="0" cy="0"/>
+          <a:chOff x="0" y="0"/>
+          <a:chExt cx="0" cy="0"/>
+        </a:xfrm>
+      </p:grpSpPr>
+      <p:sp>
+        <p:nvSpPr>
+          <p:cNvPr id="2" name="Title 1"/>
+          <p:cNvSpPr>
+            <a:spLocks noGrp="1"/>
+          </p:cNvSpPr>
+          <p:nvPr>
+            <p:ph type="title"/>
+          </p:nvPr>
+        </p:nvSpPr>
+        <p:spPr/>
+        <p:txBody>
+          <a:bodyPr/>
+          <a:lstStyle/>
+          <a:p>
+            <a:r>
+              <a:rPr lang="en-US" dirty="0" smtClean="0"/>
               <a:t>Questions?</a:t>
             </a:r>
             <a:endParaRPr lang="en-US" dirty="0"/>
@@ -6250,7 +6741,7 @@
 </p:sld>
 </file>
 
-<file path=ppt/slides/slide11.xml><?xml version="1.0" encoding="utf-8"?>
+<file path=ppt/slides/slide16.xml><?xml version="1.0" encoding="utf-8"?>
 <p:sld xmlns:a="http://schemas.openxmlformats.org/drawingml/2006/main" xmlns:r="http://schemas.openxmlformats.org/officeDocument/2006/relationships" xmlns:p="http://schemas.openxmlformats.org/presentationml/2006/main">
   <p:cSld>
     <p:spTree>
@@ -6753,15 +7244,7 @@
           <a:p>
             <a:r>
               <a:rPr lang="en-US" dirty="0" smtClean="0"/>
-              <a:t>Starting in Java 7</a:t>
-            </a:r>
-            <a:r>
-              <a:rPr lang="en-US" dirty="0" smtClean="0"/>
-              <a:t>, however, </a:t>
-            </a:r>
-            <a:r>
-              <a:rPr lang="en-US" dirty="0" smtClean="0"/>
-              <a:t>it has been possible to use generics more concisely</a:t>
+              <a:t>Starting in Java 7, however, it has been possible to use generics more concisely</a:t>
             </a:r>
           </a:p>
           <a:p>

</xml_diff>

<commit_message>
I added a section about exception handling
</commit_message>
<xml_diff>
--- a/New Features of Java 7 and 8.pptx
+++ b/New Features of Java 7 and 8.pptx
@@ -12,10 +12,13 @@
     <p:sldId id="264" r:id="rId6"/>
     <p:sldId id="265" r:id="rId7"/>
     <p:sldId id="266" r:id="rId8"/>
-    <p:sldId id="260" r:id="rId9"/>
-    <p:sldId id="261" r:id="rId10"/>
-    <p:sldId id="262" r:id="rId11"/>
-    <p:sldId id="263" r:id="rId12"/>
+    <p:sldId id="267" r:id="rId9"/>
+    <p:sldId id="268" r:id="rId10"/>
+    <p:sldId id="269" r:id="rId11"/>
+    <p:sldId id="260" r:id="rId12"/>
+    <p:sldId id="261" r:id="rId13"/>
+    <p:sldId id="262" r:id="rId14"/>
+    <p:sldId id="263" r:id="rId15"/>
   </p:sldIdLst>
   <p:sldSz cx="12192000" cy="6858000"/>
   <p:notesSz cx="6858000" cy="9144000"/>
@@ -6231,6 +6234,306 @@
           <a:p>
             <a:r>
               <a:rPr lang="en-US" dirty="0" smtClean="0"/>
+              <a:t>Handling Multiple Exception Types</a:t>
+            </a:r>
+            <a:endParaRPr lang="en-US" dirty="0"/>
+          </a:p>
+        </p:txBody>
+      </p:sp>
+      <p:sp>
+        <p:nvSpPr>
+          <p:cNvPr id="3" name="Content Placeholder 2"/>
+          <p:cNvSpPr>
+            <a:spLocks noGrp="1"/>
+          </p:cNvSpPr>
+          <p:nvPr>
+            <p:ph idx="1"/>
+          </p:nvPr>
+        </p:nvSpPr>
+        <p:spPr/>
+        <p:txBody>
+          <a:bodyPr/>
+          <a:lstStyle/>
+          <a:p>
+            <a:r>
+              <a:rPr lang="en-US" dirty="0" smtClean="0"/>
+              <a:t>Advantages of New Syntax:</a:t>
+            </a:r>
+          </a:p>
+          <a:p>
+            <a:pPr lvl="1"/>
+            <a:r>
+              <a:rPr lang="en-US" dirty="0"/>
+              <a:t>“Bytecode generated by compiling a catch block that handles multiple exception types will be smaller (and thus superior) than compiling many catch blocks that handle only one exception type each. A catch block that handles multiple exception types creates no duplication in the bytecode generated by the compiler; the bytecode has no replication of exception </a:t>
+            </a:r>
+            <a:r>
+              <a:rPr lang="en-US" dirty="0" smtClean="0"/>
+              <a:t>handlers”</a:t>
+            </a:r>
+          </a:p>
+          <a:p>
+            <a:pPr marL="1828800" lvl="4" indent="0">
+              <a:buNone/>
+            </a:pPr>
+            <a:r>
+              <a:rPr lang="en-US" dirty="0" smtClean="0"/>
+              <a:t>								- Oracle.com</a:t>
+            </a:r>
+            <a:endParaRPr lang="en-US" dirty="0"/>
+          </a:p>
+        </p:txBody>
+      </p:sp>
+    </p:spTree>
+    <p:extLst>
+      <p:ext uri="{BB962C8B-B14F-4D97-AF65-F5344CB8AC3E}">
+        <p14:creationId xmlns:p14="http://schemas.microsoft.com/office/powerpoint/2010/main" val="627164694"/>
+      </p:ext>
+    </p:extLst>
+  </p:cSld>
+  <p:clrMapOvr>
+    <a:masterClrMapping/>
+  </p:clrMapOvr>
+</p:sld>
+</file>
+
+<file path=ppt/slides/slide11.xml><?xml version="1.0" encoding="utf-8"?>
+<p:sld xmlns:a="http://schemas.openxmlformats.org/drawingml/2006/main" xmlns:r="http://schemas.openxmlformats.org/officeDocument/2006/relationships" xmlns:p="http://schemas.openxmlformats.org/presentationml/2006/main">
+  <p:cSld>
+    <p:spTree>
+      <p:nvGrpSpPr>
+        <p:cNvPr id="1" name=""/>
+        <p:cNvGrpSpPr/>
+        <p:nvPr/>
+      </p:nvGrpSpPr>
+      <p:grpSpPr>
+        <a:xfrm>
+          <a:off x="0" y="0"/>
+          <a:ext cx="0" cy="0"/>
+          <a:chOff x="0" y="0"/>
+          <a:chExt cx="0" cy="0"/>
+        </a:xfrm>
+      </p:grpSpPr>
+      <p:sp>
+        <p:nvSpPr>
+          <p:cNvPr id="2" name="Title 1"/>
+          <p:cNvSpPr>
+            <a:spLocks noGrp="1"/>
+          </p:cNvSpPr>
+          <p:nvPr>
+            <p:ph type="title"/>
+          </p:nvPr>
+        </p:nvSpPr>
+        <p:spPr/>
+        <p:txBody>
+          <a:bodyPr/>
+          <a:lstStyle/>
+          <a:p>
+            <a:r>
+              <a:rPr lang="en-US" dirty="0" smtClean="0"/>
+              <a:t>Lambda Expressions</a:t>
+            </a:r>
+            <a:endParaRPr lang="en-US" dirty="0"/>
+          </a:p>
+        </p:txBody>
+      </p:sp>
+      <p:sp>
+        <p:nvSpPr>
+          <p:cNvPr id="3" name="Content Placeholder 2"/>
+          <p:cNvSpPr>
+            <a:spLocks noGrp="1"/>
+          </p:cNvSpPr>
+          <p:nvPr>
+            <p:ph idx="1"/>
+          </p:nvPr>
+        </p:nvSpPr>
+        <p:spPr/>
+        <p:txBody>
+          <a:bodyPr/>
+          <a:lstStyle/>
+          <a:p>
+            <a:r>
+              <a:rPr lang="en-US" dirty="0" smtClean="0"/>
+              <a:t>Have been in other languages, such as C#, for a long time.</a:t>
+            </a:r>
+          </a:p>
+          <a:p>
+            <a:r>
+              <a:rPr lang="en-US" dirty="0" smtClean="0"/>
+              <a:t>The Java designers were hesitant to add this, but it was finally added in Java 8.</a:t>
+            </a:r>
+          </a:p>
+          <a:p>
+            <a:r>
+              <a:rPr lang="en-US" dirty="0" smtClean="0"/>
+              <a:t>A block of code that you can pass to parameters, without actually creating a method.</a:t>
+            </a:r>
+          </a:p>
+          <a:p>
+            <a:r>
+              <a:rPr lang="en-US" dirty="0" smtClean="0"/>
+              <a:t>These can make programs much more compact and easy to read and understand.</a:t>
+            </a:r>
+          </a:p>
+          <a:p>
+            <a:r>
+              <a:rPr lang="en-US" dirty="0" smtClean="0"/>
+              <a:t>example – (Integer p1, Integer p2) -&gt; { </a:t>
+            </a:r>
+            <a:r>
+              <a:rPr lang="en-US" dirty="0" err="1" smtClean="0"/>
+              <a:t>int</a:t>
+            </a:r>
+            <a:r>
+              <a:rPr lang="en-US" dirty="0" smtClean="0"/>
+              <a:t> sum=p1+p2; return sum;}</a:t>
+            </a:r>
+            <a:endParaRPr lang="en-US" dirty="0"/>
+          </a:p>
+        </p:txBody>
+      </p:sp>
+    </p:spTree>
+    <p:extLst>
+      <p:ext uri="{BB962C8B-B14F-4D97-AF65-F5344CB8AC3E}">
+        <p14:creationId xmlns:p14="http://schemas.microsoft.com/office/powerpoint/2010/main" val="4080671300"/>
+      </p:ext>
+    </p:extLst>
+  </p:cSld>
+  <p:clrMapOvr>
+    <a:masterClrMapping/>
+  </p:clrMapOvr>
+  <p:timing>
+    <p:tnLst>
+      <p:par>
+        <p:cTn id="1" dur="indefinite" restart="never" nodeType="tmRoot"/>
+      </p:par>
+    </p:tnLst>
+  </p:timing>
+</p:sld>
+</file>
+
+<file path=ppt/slides/slide12.xml><?xml version="1.0" encoding="utf-8"?>
+<p:sld xmlns:a="http://schemas.openxmlformats.org/drawingml/2006/main" xmlns:r="http://schemas.openxmlformats.org/officeDocument/2006/relationships" xmlns:p="http://schemas.openxmlformats.org/presentationml/2006/main">
+  <p:cSld>
+    <p:spTree>
+      <p:nvGrpSpPr>
+        <p:cNvPr id="1" name=""/>
+        <p:cNvGrpSpPr/>
+        <p:nvPr/>
+      </p:nvGrpSpPr>
+      <p:grpSpPr>
+        <a:xfrm>
+          <a:off x="0" y="0"/>
+          <a:ext cx="0" cy="0"/>
+          <a:chOff x="0" y="0"/>
+          <a:chExt cx="0" cy="0"/>
+        </a:xfrm>
+      </p:grpSpPr>
+      <p:sp>
+        <p:nvSpPr>
+          <p:cNvPr id="2" name="Title 1"/>
+          <p:cNvSpPr>
+            <a:spLocks noGrp="1"/>
+          </p:cNvSpPr>
+          <p:nvPr>
+            <p:ph type="title"/>
+          </p:nvPr>
+        </p:nvSpPr>
+        <p:spPr/>
+        <p:txBody>
+          <a:bodyPr/>
+          <a:lstStyle/>
+          <a:p>
+            <a:r>
+              <a:rPr lang="en-US" dirty="0" smtClean="0"/>
+              <a:t>New Features of Interfaces</a:t>
+            </a:r>
+            <a:endParaRPr lang="en-US" dirty="0"/>
+          </a:p>
+        </p:txBody>
+      </p:sp>
+      <p:sp>
+        <p:nvSpPr>
+          <p:cNvPr id="3" name="Content Placeholder 2"/>
+          <p:cNvSpPr>
+            <a:spLocks noGrp="1"/>
+          </p:cNvSpPr>
+          <p:nvPr>
+            <p:ph idx="1"/>
+          </p:nvPr>
+        </p:nvSpPr>
+        <p:spPr/>
+        <p:txBody>
+          <a:bodyPr/>
+          <a:lstStyle/>
+          <a:p>
+            <a:r>
+              <a:rPr lang="en-US" dirty="0" smtClean="0"/>
+              <a:t>Can now contain default methods that don’t need to be implemented</a:t>
+            </a:r>
+          </a:p>
+          <a:p>
+            <a:pPr lvl="1"/>
+            <a:r>
+              <a:rPr lang="en-US" dirty="0" smtClean="0"/>
+              <a:t>Useful when an interface should provide additional functionality</a:t>
+            </a:r>
+          </a:p>
+        </p:txBody>
+      </p:sp>
+    </p:spTree>
+    <p:extLst>
+      <p:ext uri="{BB962C8B-B14F-4D97-AF65-F5344CB8AC3E}">
+        <p14:creationId xmlns:p14="http://schemas.microsoft.com/office/powerpoint/2010/main" val="895488345"/>
+      </p:ext>
+    </p:extLst>
+  </p:cSld>
+  <p:clrMapOvr>
+    <a:masterClrMapping/>
+  </p:clrMapOvr>
+  <p:timing>
+    <p:tnLst>
+      <p:par>
+        <p:cTn id="1" dur="indefinite" restart="never" nodeType="tmRoot"/>
+      </p:par>
+    </p:tnLst>
+  </p:timing>
+</p:sld>
+</file>
+
+<file path=ppt/slides/slide13.xml><?xml version="1.0" encoding="utf-8"?>
+<p:sld xmlns:a="http://schemas.openxmlformats.org/drawingml/2006/main" xmlns:r="http://schemas.openxmlformats.org/officeDocument/2006/relationships" xmlns:p="http://schemas.openxmlformats.org/presentationml/2006/main">
+  <p:cSld>
+    <p:spTree>
+      <p:nvGrpSpPr>
+        <p:cNvPr id="1" name=""/>
+        <p:cNvGrpSpPr/>
+        <p:nvPr/>
+      </p:nvGrpSpPr>
+      <p:grpSpPr>
+        <a:xfrm>
+          <a:off x="0" y="0"/>
+          <a:ext cx="0" cy="0"/>
+          <a:chOff x="0" y="0"/>
+          <a:chExt cx="0" cy="0"/>
+        </a:xfrm>
+      </p:grpSpPr>
+      <p:sp>
+        <p:nvSpPr>
+          <p:cNvPr id="2" name="Title 1"/>
+          <p:cNvSpPr>
+            <a:spLocks noGrp="1"/>
+          </p:cNvSpPr>
+          <p:nvPr>
+            <p:ph type="title"/>
+          </p:nvPr>
+        </p:nvSpPr>
+        <p:spPr/>
+        <p:txBody>
+          <a:bodyPr/>
+          <a:lstStyle/>
+          <a:p>
+            <a:r>
+              <a:rPr lang="en-US" dirty="0" smtClean="0"/>
               <a:t>Questions?</a:t>
             </a:r>
             <a:endParaRPr lang="en-US" dirty="0"/>
@@ -6276,7 +6579,7 @@
 </p:sld>
 </file>
 
-<file path=ppt/slides/slide11.xml><?xml version="1.0" encoding="utf-8"?>
+<file path=ppt/slides/slide14.xml><?xml version="1.0" encoding="utf-8"?>
 <p:sld xmlns:a="http://schemas.openxmlformats.org/drawingml/2006/main" xmlns:r="http://schemas.openxmlformats.org/officeDocument/2006/relationships" xmlns:p="http://schemas.openxmlformats.org/presentationml/2006/main">
   <p:cSld>
     <p:spTree>
@@ -6437,8 +6740,19 @@
           <a:p>
             <a:r>
               <a:rPr lang="en-US" dirty="0" smtClean="0"/>
-              <a:t>Strings in switch statements</a:t>
-            </a:r>
+              <a:t>Strings in switch </a:t>
+            </a:r>
+            <a:r>
+              <a:rPr lang="en-US" dirty="0" smtClean="0"/>
+              <a:t>statements</a:t>
+            </a:r>
+          </a:p>
+          <a:p>
+            <a:r>
+              <a:rPr lang="en-US" dirty="0" smtClean="0"/>
+              <a:t>Handling Multiple Types of Exceptions</a:t>
+            </a:r>
+            <a:endParaRPr lang="en-US" dirty="0" smtClean="0"/>
           </a:p>
           <a:p>
             <a:pPr marL="0" indent="0">
@@ -7140,7 +7454,7 @@
           <a:p>
             <a:r>
               <a:rPr lang="en-US" dirty="0" smtClean="0"/>
-              <a:t>Lambda Expressions</a:t>
+              <a:t>Handling Multiple Exception Types</a:t>
             </a:r>
             <a:endParaRPr lang="en-US" dirty="0"/>
           </a:p>
@@ -7158,66 +7472,119 @@
         </p:nvSpPr>
         <p:spPr/>
         <p:txBody>
-          <a:bodyPr/>
+          <a:bodyPr>
+            <a:normAutofit fontScale="92500" lnSpcReduction="20000"/>
+          </a:bodyPr>
           <a:lstStyle/>
           <a:p>
             <a:r>
               <a:rPr lang="en-US" dirty="0" smtClean="0"/>
-              <a:t>Have been in other languages, such as C#, for a long time.</a:t>
-            </a:r>
-          </a:p>
-          <a:p>
+              <a:t>Before Java 7 catch blocks had to be written like:</a:t>
+            </a:r>
+          </a:p>
+          <a:p>
+            <a:pPr marL="0" indent="0">
+              <a:buNone/>
+            </a:pPr>
+            <a:endParaRPr lang="en-US" dirty="0"/>
+          </a:p>
+          <a:p>
+            <a:pPr marL="0" indent="0">
+              <a:buNone/>
+            </a:pPr>
+            <a:r>
+              <a:rPr lang="en-US" dirty="0"/>
+              <a:t>catch (IOException ex) </a:t>
+            </a:r>
+            <a:endParaRPr lang="en-US" dirty="0" smtClean="0"/>
+          </a:p>
+          <a:p>
+            <a:pPr marL="0" indent="0">
+              <a:buNone/>
+            </a:pPr>
             <a:r>
               <a:rPr lang="en-US" dirty="0" smtClean="0"/>
-              <a:t>The Java designers were hesitant to add this, but it was finally added in Java 8.</a:t>
-            </a:r>
-          </a:p>
-          <a:p>
+              <a:t>{</a:t>
+            </a:r>
+            <a:endParaRPr lang="en-US" dirty="0"/>
+          </a:p>
+          <a:p>
+            <a:pPr marL="0" indent="0">
+              <a:buNone/>
+            </a:pPr>
+            <a:r>
+              <a:rPr lang="en-US" dirty="0"/>
+              <a:t>     logger.log(ex);</a:t>
+            </a:r>
+          </a:p>
+          <a:p>
+            <a:pPr marL="0" indent="0">
+              <a:buNone/>
+            </a:pPr>
+            <a:r>
+              <a:rPr lang="en-US" dirty="0"/>
+              <a:t>     throw ex;</a:t>
+            </a:r>
+          </a:p>
+          <a:p>
+            <a:pPr marL="0" indent="0">
+              <a:buNone/>
+            </a:pPr>
+            <a:r>
+              <a:rPr lang="en-US" dirty="0"/>
+              <a:t>catch (SQLException ex) </a:t>
+            </a:r>
+            <a:endParaRPr lang="en-US" dirty="0" smtClean="0"/>
+          </a:p>
+          <a:p>
+            <a:pPr marL="0" indent="0">
+              <a:buNone/>
+            </a:pPr>
             <a:r>
               <a:rPr lang="en-US" dirty="0" smtClean="0"/>
-              <a:t>A block of code that you can pass to parameters, without actually creating a method.</a:t>
-            </a:r>
-          </a:p>
-          <a:p>
-            <a:r>
-              <a:rPr lang="en-US" dirty="0" smtClean="0"/>
-              <a:t>These can make programs much more compact and easy to read and understand.</a:t>
-            </a:r>
-          </a:p>
-          <a:p>
-            <a:r>
-              <a:rPr lang="en-US" dirty="0" smtClean="0"/>
-              <a:t>example – (Integer p1, Integer p2) -&gt; { </a:t>
-            </a:r>
-            <a:r>
-              <a:rPr lang="en-US" dirty="0" err="1" smtClean="0"/>
-              <a:t>int</a:t>
-            </a:r>
-            <a:r>
-              <a:rPr lang="en-US" dirty="0" smtClean="0"/>
-              <a:t> sum=p1+p2; return sum;}</a:t>
+              <a:t>{</a:t>
             </a:r>
             <a:endParaRPr lang="en-US" dirty="0"/>
+          </a:p>
+          <a:p>
+            <a:pPr marL="0" indent="0">
+              <a:buNone/>
+            </a:pPr>
+            <a:r>
+              <a:rPr lang="en-US" dirty="0"/>
+              <a:t>     logger.log(ex);</a:t>
+            </a:r>
+          </a:p>
+          <a:p>
+            <a:pPr marL="0" indent="0">
+              <a:buNone/>
+            </a:pPr>
+            <a:r>
+              <a:rPr lang="en-US" dirty="0"/>
+              <a:t>     throw ex;</a:t>
+            </a:r>
+          </a:p>
+          <a:p>
+            <a:pPr marL="0" indent="0">
+              <a:buNone/>
+            </a:pPr>
+            <a:r>
+              <a:rPr lang="en-US" dirty="0"/>
+              <a:t>}</a:t>
+            </a:r>
           </a:p>
         </p:txBody>
       </p:sp>
     </p:spTree>
     <p:extLst>
       <p:ext uri="{BB962C8B-B14F-4D97-AF65-F5344CB8AC3E}">
-        <p14:creationId xmlns:p14="http://schemas.microsoft.com/office/powerpoint/2010/main" val="4080671300"/>
+        <p14:creationId xmlns:p14="http://schemas.microsoft.com/office/powerpoint/2010/main" val="4114222297"/>
       </p:ext>
     </p:extLst>
   </p:cSld>
   <p:clrMapOvr>
     <a:masterClrMapping/>
   </p:clrMapOvr>
-  <p:timing>
-    <p:tnLst>
-      <p:par>
-        <p:cTn id="1" dur="indefinite" restart="never" nodeType="tmRoot"/>
-      </p:par>
-    </p:tnLst>
-  </p:timing>
 </p:sld>
 </file>
 
@@ -7255,7 +7622,7 @@
           <a:p>
             <a:r>
               <a:rPr lang="en-US" dirty="0" smtClean="0"/>
-              <a:t>New Features of Interfaces</a:t>
+              <a:t>Handling Multiple Exception Types</a:t>
             </a:r>
             <a:endParaRPr lang="en-US" dirty="0"/>
           </a:p>
@@ -7278,14 +7645,60 @@
           <a:p>
             <a:r>
               <a:rPr lang="en-US" dirty="0" smtClean="0"/>
-              <a:t>Can now contain default methods that don’t need to be implemented</a:t>
-            </a:r>
-          </a:p>
-          <a:p>
-            <a:pPr lvl="1"/>
+              <a:t>New in Java 7 is the capability to write catch blocks that look like:</a:t>
+            </a:r>
+          </a:p>
+          <a:p>
+            <a:pPr marL="0" indent="0">
+              <a:buNone/>
+            </a:pPr>
+            <a:endParaRPr lang="en-US" dirty="0"/>
+          </a:p>
+          <a:p>
+            <a:pPr marL="0" indent="0">
+              <a:buNone/>
+            </a:pPr>
+            <a:r>
+              <a:rPr lang="en-US" dirty="0"/>
+              <a:t>catch (IOException|SQLException ex) </a:t>
+            </a:r>
+            <a:endParaRPr lang="en-US" dirty="0" smtClean="0"/>
+          </a:p>
+          <a:p>
+            <a:pPr marL="0" indent="0">
+              <a:buNone/>
+            </a:pPr>
             <a:r>
               <a:rPr lang="en-US" dirty="0" smtClean="0"/>
-              <a:t>Useful when an interface should provide additional functionality</a:t>
+              <a:t>{</a:t>
+            </a:r>
+            <a:endParaRPr lang="en-US" dirty="0"/>
+          </a:p>
+          <a:p>
+            <a:pPr marL="0" indent="0">
+              <a:buNone/>
+            </a:pPr>
+            <a:r>
+              <a:rPr lang="en-US" dirty="0"/>
+              <a:t>    logger.log(ex);</a:t>
+            </a:r>
+          </a:p>
+          <a:p>
+            <a:pPr marL="0" indent="0">
+              <a:buNone/>
+            </a:pPr>
+            <a:r>
+              <a:rPr lang="en-US" dirty="0"/>
+              <a:t>    throw ex;</a:t>
+            </a:r>
+          </a:p>
+          <a:p>
+            <a:pPr marL="0" indent="0">
+              <a:buNone/>
+            </a:pPr>
+            <a:r>
+              <a:rPr lang="en-US" dirty="0"/>
+              <a:t>}</a:t>
             </a:r>
           </a:p>
         </p:txBody>
@@ -7293,20 +7706,13 @@
     </p:spTree>
     <p:extLst>
       <p:ext uri="{BB962C8B-B14F-4D97-AF65-F5344CB8AC3E}">
-        <p14:creationId xmlns:p14="http://schemas.microsoft.com/office/powerpoint/2010/main" val="895488345"/>
+        <p14:creationId xmlns:p14="http://schemas.microsoft.com/office/powerpoint/2010/main" val="1929767007"/>
       </p:ext>
     </p:extLst>
   </p:cSld>
   <p:clrMapOvr>
     <a:masterClrMapping/>
   </p:clrMapOvr>
-  <p:timing>
-    <p:tnLst>
-      <p:par>
-        <p:cTn id="1" dur="indefinite" restart="never" nodeType="tmRoot"/>
-      </p:par>
-    </p:tnLst>
-  </p:timing>
 </p:sld>
 </file>
 

</xml_diff>

<commit_message>
Changed the slides a little...
</commit_message>
<xml_diff>
--- a/New Features of Java 7 and 8.pptx
+++ b/New Features of Java 7 and 8.pptx
@@ -11,14 +11,16 @@
     <p:sldId id="259" r:id="rId5"/>
     <p:sldId id="264" r:id="rId6"/>
     <p:sldId id="265" r:id="rId7"/>
-    <p:sldId id="266" r:id="rId8"/>
-    <p:sldId id="267" r:id="rId9"/>
-    <p:sldId id="268" r:id="rId10"/>
-    <p:sldId id="269" r:id="rId11"/>
-    <p:sldId id="260" r:id="rId12"/>
-    <p:sldId id="261" r:id="rId13"/>
-    <p:sldId id="262" r:id="rId14"/>
-    <p:sldId id="263" r:id="rId15"/>
+    <p:sldId id="270" r:id="rId8"/>
+    <p:sldId id="266" r:id="rId9"/>
+    <p:sldId id="271" r:id="rId10"/>
+    <p:sldId id="267" r:id="rId11"/>
+    <p:sldId id="268" r:id="rId12"/>
+    <p:sldId id="269" r:id="rId13"/>
+    <p:sldId id="260" r:id="rId14"/>
+    <p:sldId id="261" r:id="rId15"/>
+    <p:sldId id="262" r:id="rId16"/>
+    <p:sldId id="263" r:id="rId17"/>
   </p:sldIdLst>
   <p:sldSz cx="12192000" cy="6858000"/>
   <p:notesSz cx="6858000" cy="9144000"/>
@@ -6252,47 +6254,126 @@
         </p:nvSpPr>
         <p:spPr/>
         <p:txBody>
-          <a:bodyPr/>
+          <a:bodyPr>
+            <a:normAutofit fontScale="92500" lnSpcReduction="20000"/>
+          </a:bodyPr>
           <a:lstStyle/>
           <a:p>
             <a:r>
               <a:rPr lang="en-US" dirty="0" smtClean="0"/>
-              <a:t>Advantages of New Syntax:</a:t>
-            </a:r>
-          </a:p>
-          <a:p>
-            <a:pPr lvl="1"/>
+              <a:t>Before Java 7 catch blocks had to be written like:</a:t>
+            </a:r>
+          </a:p>
+          <a:p>
+            <a:pPr marL="0" indent="0">
+              <a:buNone/>
+            </a:pPr>
+            <a:endParaRPr lang="en-US" dirty="0"/>
+          </a:p>
+          <a:p>
+            <a:pPr marL="0" indent="0">
+              <a:buNone/>
+            </a:pPr>
             <a:r>
               <a:rPr lang="en-US" dirty="0"/>
-              <a:t>“Bytecode generated by compiling a catch block that handles multiple exception types will be smaller (and thus superior) than compiling many catch blocks that handle only one exception type each. A catch block that handles multiple exception types creates no duplication in the bytecode generated by the compiler; the bytecode has no replication of exception </a:t>
-            </a:r>
+              <a:t>catch (IOException ex) </a:t>
+            </a:r>
+            <a:endParaRPr lang="en-US" dirty="0" smtClean="0"/>
+          </a:p>
+          <a:p>
+            <a:pPr marL="0" indent="0">
+              <a:buNone/>
+            </a:pPr>
             <a:r>
               <a:rPr lang="en-US" dirty="0" smtClean="0"/>
-              <a:t>handlers”</a:t>
-            </a:r>
-          </a:p>
-          <a:p>
-            <a:pPr marL="1828800" lvl="4" indent="0">
+              <a:t>{</a:t>
+            </a:r>
+            <a:endParaRPr lang="en-US" dirty="0"/>
+          </a:p>
+          <a:p>
+            <a:pPr marL="0" indent="0">
               <a:buNone/>
             </a:pPr>
             <a:r>
+              <a:rPr lang="en-US" dirty="0"/>
+              <a:t>     logger.log(ex);</a:t>
+            </a:r>
+          </a:p>
+          <a:p>
+            <a:pPr marL="0" indent="0">
+              <a:buNone/>
+            </a:pPr>
+            <a:r>
+              <a:rPr lang="en-US" dirty="0"/>
+              <a:t>     throw ex;</a:t>
+            </a:r>
+          </a:p>
+          <a:p>
+            <a:pPr marL="0" indent="0">
+              <a:buNone/>
+            </a:pPr>
+            <a:r>
+              <a:rPr lang="en-US" dirty="0"/>
+              <a:t>catch (SQLException ex) </a:t>
+            </a:r>
+            <a:endParaRPr lang="en-US" dirty="0" smtClean="0"/>
+          </a:p>
+          <a:p>
+            <a:pPr marL="0" indent="0">
+              <a:buNone/>
+            </a:pPr>
+            <a:r>
               <a:rPr lang="en-US" dirty="0" smtClean="0"/>
-              <a:t>								- Oracle.com</a:t>
+              <a:t>{</a:t>
             </a:r>
             <a:endParaRPr lang="en-US" dirty="0"/>
+          </a:p>
+          <a:p>
+            <a:pPr marL="0" indent="0">
+              <a:buNone/>
+            </a:pPr>
+            <a:r>
+              <a:rPr lang="en-US" dirty="0"/>
+              <a:t>     logger.log(ex);</a:t>
+            </a:r>
+          </a:p>
+          <a:p>
+            <a:pPr marL="0" indent="0">
+              <a:buNone/>
+            </a:pPr>
+            <a:r>
+              <a:rPr lang="en-US" dirty="0"/>
+              <a:t>     throw ex;</a:t>
+            </a:r>
+          </a:p>
+          <a:p>
+            <a:pPr marL="0" indent="0">
+              <a:buNone/>
+            </a:pPr>
+            <a:r>
+              <a:rPr lang="en-US" dirty="0"/>
+              <a:t>}</a:t>
+            </a:r>
           </a:p>
         </p:txBody>
       </p:sp>
     </p:spTree>
     <p:extLst>
       <p:ext uri="{BB962C8B-B14F-4D97-AF65-F5344CB8AC3E}">
-        <p14:creationId xmlns:p14="http://schemas.microsoft.com/office/powerpoint/2010/main" val="627164694"/>
+        <p14:creationId xmlns:p14="http://schemas.microsoft.com/office/powerpoint/2010/main" val="4114222297"/>
       </p:ext>
     </p:extLst>
   </p:cSld>
   <p:clrMapOvr>
     <a:masterClrMapping/>
   </p:clrMapOvr>
+  <p:timing>
+    <p:tnLst>
+      <p:par>
+        <p:cTn id="1" dur="indefinite" restart="never" nodeType="tmRoot"/>
+      </p:par>
+    </p:tnLst>
+  </p:timing>
 </p:sld>
 </file>
 
@@ -6330,7 +6411,7 @@
           <a:p>
             <a:r>
               <a:rPr lang="en-US" dirty="0" smtClean="0"/>
-              <a:t>Lambda Expressions</a:t>
+              <a:t>Handling Multiple Exception Types</a:t>
             </a:r>
             <a:endParaRPr lang="en-US" dirty="0"/>
           </a:p>
@@ -6353,48 +6434,68 @@
           <a:p>
             <a:r>
               <a:rPr lang="en-US" dirty="0" smtClean="0"/>
-              <a:t>Have been in other languages, such as C#, for a long time.</a:t>
-            </a:r>
-          </a:p>
-          <a:p>
+              <a:t>New in Java 7 is the capability to write catch blocks that look like:</a:t>
+            </a:r>
+          </a:p>
+          <a:p>
+            <a:pPr marL="0" indent="0">
+              <a:buNone/>
+            </a:pPr>
+            <a:endParaRPr lang="en-US" dirty="0"/>
+          </a:p>
+          <a:p>
+            <a:pPr marL="0" indent="0">
+              <a:buNone/>
+            </a:pPr>
+            <a:r>
+              <a:rPr lang="en-US" dirty="0"/>
+              <a:t>catch (IOException|SQLException ex) </a:t>
+            </a:r>
+            <a:endParaRPr lang="en-US" dirty="0" smtClean="0"/>
+          </a:p>
+          <a:p>
+            <a:pPr marL="0" indent="0">
+              <a:buNone/>
+            </a:pPr>
             <a:r>
               <a:rPr lang="en-US" dirty="0" smtClean="0"/>
-              <a:t>The Java designers were hesitant to add this, but it was finally added in Java 8.</a:t>
-            </a:r>
-          </a:p>
-          <a:p>
-            <a:r>
-              <a:rPr lang="en-US" dirty="0" smtClean="0"/>
-              <a:t>A block of code that you can pass to parameters, without actually creating a method.</a:t>
-            </a:r>
-          </a:p>
-          <a:p>
-            <a:r>
-              <a:rPr lang="en-US" dirty="0" smtClean="0"/>
-              <a:t>These can make programs much more compact and easy to read and understand.</a:t>
-            </a:r>
-          </a:p>
-          <a:p>
-            <a:r>
-              <a:rPr lang="en-US" dirty="0" smtClean="0"/>
-              <a:t>example – (Integer p1, Integer p2) -&gt; { </a:t>
-            </a:r>
-            <a:r>
-              <a:rPr lang="en-US" dirty="0" err="1" smtClean="0"/>
-              <a:t>int</a:t>
-            </a:r>
-            <a:r>
-              <a:rPr lang="en-US" dirty="0" smtClean="0"/>
-              <a:t> sum=p1+p2; return sum;}</a:t>
+              <a:t>{</a:t>
             </a:r>
             <a:endParaRPr lang="en-US" dirty="0"/>
+          </a:p>
+          <a:p>
+            <a:pPr marL="0" indent="0">
+              <a:buNone/>
+            </a:pPr>
+            <a:r>
+              <a:rPr lang="en-US" dirty="0"/>
+              <a:t>    logger.log(ex);</a:t>
+            </a:r>
+          </a:p>
+          <a:p>
+            <a:pPr marL="0" indent="0">
+              <a:buNone/>
+            </a:pPr>
+            <a:r>
+              <a:rPr lang="en-US" dirty="0"/>
+              <a:t>    throw ex;</a:t>
+            </a:r>
+          </a:p>
+          <a:p>
+            <a:pPr marL="0" indent="0">
+              <a:buNone/>
+            </a:pPr>
+            <a:r>
+              <a:rPr lang="en-US" dirty="0"/>
+              <a:t>}</a:t>
+            </a:r>
           </a:p>
         </p:txBody>
       </p:sp>
     </p:spTree>
     <p:extLst>
       <p:ext uri="{BB962C8B-B14F-4D97-AF65-F5344CB8AC3E}">
-        <p14:creationId xmlns:p14="http://schemas.microsoft.com/office/powerpoint/2010/main" val="4080671300"/>
+        <p14:creationId xmlns:p14="http://schemas.microsoft.com/office/powerpoint/2010/main" val="1929767007"/>
       </p:ext>
     </p:extLst>
   </p:cSld>
@@ -6445,7 +6546,7 @@
           <a:p>
             <a:r>
               <a:rPr lang="en-US" dirty="0" smtClean="0"/>
-              <a:t>New Features of Interfaces</a:t>
+              <a:t>Handling Multiple Exception Types</a:t>
             </a:r>
             <a:endParaRPr lang="en-US" dirty="0"/>
           </a:p>
@@ -6468,22 +6569,36 @@
           <a:p>
             <a:r>
               <a:rPr lang="en-US" dirty="0" smtClean="0"/>
-              <a:t>Can now contain default methods that don’t need to be implemented</a:t>
+              <a:t>Advantages of New Syntax:</a:t>
             </a:r>
           </a:p>
           <a:p>
             <a:pPr lvl="1"/>
             <a:r>
+              <a:rPr lang="en-US" dirty="0"/>
+              <a:t>“Bytecode generated by compiling a catch block that handles multiple exception types will be smaller (and thus superior) than compiling many catch blocks that handle only one exception type each. A catch block that handles multiple exception types creates no duplication in the bytecode generated by the compiler; the bytecode has no replication of exception </a:t>
+            </a:r>
+            <a:r>
               <a:rPr lang="en-US" dirty="0" smtClean="0"/>
-              <a:t>Useful when an interface should provide additional functionality</a:t>
-            </a:r>
+              <a:t>handlers”</a:t>
+            </a:r>
+          </a:p>
+          <a:p>
+            <a:pPr marL="1828800" lvl="4" indent="0">
+              <a:buNone/>
+            </a:pPr>
+            <a:r>
+              <a:rPr lang="en-US" dirty="0" smtClean="0"/>
+              <a:t>								- oracle.com</a:t>
+            </a:r>
+            <a:endParaRPr lang="en-US" dirty="0"/>
           </a:p>
         </p:txBody>
       </p:sp>
     </p:spTree>
     <p:extLst>
       <p:ext uri="{BB962C8B-B14F-4D97-AF65-F5344CB8AC3E}">
-        <p14:creationId xmlns:p14="http://schemas.microsoft.com/office/powerpoint/2010/main" val="895488345"/>
+        <p14:creationId xmlns:p14="http://schemas.microsoft.com/office/powerpoint/2010/main" val="627164694"/>
       </p:ext>
     </p:extLst>
   </p:cSld>
@@ -6534,6 +6649,210 @@
           <a:p>
             <a:r>
               <a:rPr lang="en-US" dirty="0" smtClean="0"/>
+              <a:t>Lambda Expressions</a:t>
+            </a:r>
+            <a:endParaRPr lang="en-US" dirty="0"/>
+          </a:p>
+        </p:txBody>
+      </p:sp>
+      <p:sp>
+        <p:nvSpPr>
+          <p:cNvPr id="3" name="Content Placeholder 2"/>
+          <p:cNvSpPr>
+            <a:spLocks noGrp="1"/>
+          </p:cNvSpPr>
+          <p:nvPr>
+            <p:ph idx="1"/>
+          </p:nvPr>
+        </p:nvSpPr>
+        <p:spPr/>
+        <p:txBody>
+          <a:bodyPr/>
+          <a:lstStyle/>
+          <a:p>
+            <a:r>
+              <a:rPr lang="en-US" dirty="0" smtClean="0"/>
+              <a:t>Have been in other languages, such as C#, for a long time.</a:t>
+            </a:r>
+          </a:p>
+          <a:p>
+            <a:r>
+              <a:rPr lang="en-US" dirty="0" smtClean="0"/>
+              <a:t>The Java designers were hesitant to add this, but it was finally added in Java 8.</a:t>
+            </a:r>
+          </a:p>
+          <a:p>
+            <a:r>
+              <a:rPr lang="en-US" dirty="0" smtClean="0"/>
+              <a:t>A block of code that you can pass to parameters, without actually creating a method.</a:t>
+            </a:r>
+          </a:p>
+          <a:p>
+            <a:r>
+              <a:rPr lang="en-US" dirty="0" smtClean="0"/>
+              <a:t>These can make programs much more compact and easy to read and understand.</a:t>
+            </a:r>
+          </a:p>
+          <a:p>
+            <a:r>
+              <a:rPr lang="en-US" dirty="0" smtClean="0"/>
+              <a:t>example – (Integer p1, Integer p2) -&gt; { </a:t>
+            </a:r>
+            <a:r>
+              <a:rPr lang="en-US" dirty="0" err="1" smtClean="0"/>
+              <a:t>int</a:t>
+            </a:r>
+            <a:r>
+              <a:rPr lang="en-US" dirty="0" smtClean="0"/>
+              <a:t> sum=p1+p2; return sum;}</a:t>
+            </a:r>
+            <a:endParaRPr lang="en-US" dirty="0"/>
+          </a:p>
+        </p:txBody>
+      </p:sp>
+    </p:spTree>
+    <p:extLst>
+      <p:ext uri="{BB962C8B-B14F-4D97-AF65-F5344CB8AC3E}">
+        <p14:creationId xmlns:p14="http://schemas.microsoft.com/office/powerpoint/2010/main" val="4080671300"/>
+      </p:ext>
+    </p:extLst>
+  </p:cSld>
+  <p:clrMapOvr>
+    <a:masterClrMapping/>
+  </p:clrMapOvr>
+  <p:timing>
+    <p:tnLst>
+      <p:par>
+        <p:cTn id="1" dur="indefinite" restart="never" nodeType="tmRoot"/>
+      </p:par>
+    </p:tnLst>
+  </p:timing>
+</p:sld>
+</file>
+
+<file path=ppt/slides/slide14.xml><?xml version="1.0" encoding="utf-8"?>
+<p:sld xmlns:a="http://schemas.openxmlformats.org/drawingml/2006/main" xmlns:r="http://schemas.openxmlformats.org/officeDocument/2006/relationships" xmlns:p="http://schemas.openxmlformats.org/presentationml/2006/main">
+  <p:cSld>
+    <p:spTree>
+      <p:nvGrpSpPr>
+        <p:cNvPr id="1" name=""/>
+        <p:cNvGrpSpPr/>
+        <p:nvPr/>
+      </p:nvGrpSpPr>
+      <p:grpSpPr>
+        <a:xfrm>
+          <a:off x="0" y="0"/>
+          <a:ext cx="0" cy="0"/>
+          <a:chOff x="0" y="0"/>
+          <a:chExt cx="0" cy="0"/>
+        </a:xfrm>
+      </p:grpSpPr>
+      <p:sp>
+        <p:nvSpPr>
+          <p:cNvPr id="2" name="Title 1"/>
+          <p:cNvSpPr>
+            <a:spLocks noGrp="1"/>
+          </p:cNvSpPr>
+          <p:nvPr>
+            <p:ph type="title"/>
+          </p:nvPr>
+        </p:nvSpPr>
+        <p:spPr/>
+        <p:txBody>
+          <a:bodyPr/>
+          <a:lstStyle/>
+          <a:p>
+            <a:r>
+              <a:rPr lang="en-US" dirty="0" smtClean="0"/>
+              <a:t>New Features of Interfaces</a:t>
+            </a:r>
+            <a:endParaRPr lang="en-US" dirty="0"/>
+          </a:p>
+        </p:txBody>
+      </p:sp>
+      <p:sp>
+        <p:nvSpPr>
+          <p:cNvPr id="3" name="Content Placeholder 2"/>
+          <p:cNvSpPr>
+            <a:spLocks noGrp="1"/>
+          </p:cNvSpPr>
+          <p:nvPr>
+            <p:ph idx="1"/>
+          </p:nvPr>
+        </p:nvSpPr>
+        <p:spPr/>
+        <p:txBody>
+          <a:bodyPr/>
+          <a:lstStyle/>
+          <a:p>
+            <a:r>
+              <a:rPr lang="en-US" dirty="0" smtClean="0"/>
+              <a:t>Can now contain default methods that don’t need to be implemented</a:t>
+            </a:r>
+          </a:p>
+          <a:p>
+            <a:pPr lvl="1"/>
+            <a:r>
+              <a:rPr lang="en-US" dirty="0" smtClean="0"/>
+              <a:t>Useful when an interface should provide additional functionality</a:t>
+            </a:r>
+          </a:p>
+        </p:txBody>
+      </p:sp>
+    </p:spTree>
+    <p:extLst>
+      <p:ext uri="{BB962C8B-B14F-4D97-AF65-F5344CB8AC3E}">
+        <p14:creationId xmlns:p14="http://schemas.microsoft.com/office/powerpoint/2010/main" val="895488345"/>
+      </p:ext>
+    </p:extLst>
+  </p:cSld>
+  <p:clrMapOvr>
+    <a:masterClrMapping/>
+  </p:clrMapOvr>
+  <p:timing>
+    <p:tnLst>
+      <p:par>
+        <p:cTn id="1" dur="indefinite" restart="never" nodeType="tmRoot"/>
+      </p:par>
+    </p:tnLst>
+  </p:timing>
+</p:sld>
+</file>
+
+<file path=ppt/slides/slide15.xml><?xml version="1.0" encoding="utf-8"?>
+<p:sld xmlns:a="http://schemas.openxmlformats.org/drawingml/2006/main" xmlns:r="http://schemas.openxmlformats.org/officeDocument/2006/relationships" xmlns:p="http://schemas.openxmlformats.org/presentationml/2006/main">
+  <p:cSld>
+    <p:spTree>
+      <p:nvGrpSpPr>
+        <p:cNvPr id="1" name=""/>
+        <p:cNvGrpSpPr/>
+        <p:nvPr/>
+      </p:nvGrpSpPr>
+      <p:grpSpPr>
+        <a:xfrm>
+          <a:off x="0" y="0"/>
+          <a:ext cx="0" cy="0"/>
+          <a:chOff x="0" y="0"/>
+          <a:chExt cx="0" cy="0"/>
+        </a:xfrm>
+      </p:grpSpPr>
+      <p:sp>
+        <p:nvSpPr>
+          <p:cNvPr id="2" name="Title 1"/>
+          <p:cNvSpPr>
+            <a:spLocks noGrp="1"/>
+          </p:cNvSpPr>
+          <p:nvPr>
+            <p:ph type="title"/>
+          </p:nvPr>
+        </p:nvSpPr>
+        <p:spPr/>
+        <p:txBody>
+          <a:bodyPr/>
+          <a:lstStyle/>
+          <a:p>
+            <a:r>
+              <a:rPr lang="en-US" dirty="0" smtClean="0"/>
               <a:t>Questions?</a:t>
             </a:r>
             <a:endParaRPr lang="en-US" dirty="0"/>
@@ -6579,7 +6898,7 @@
 </p:sld>
 </file>
 
-<file path=ppt/slides/slide14.xml><?xml version="1.0" encoding="utf-8"?>
+<file path=ppt/slides/slide16.xml><?xml version="1.0" encoding="utf-8"?>
 <p:sld xmlns:a="http://schemas.openxmlformats.org/drawingml/2006/main" xmlns:r="http://schemas.openxmlformats.org/officeDocument/2006/relationships" xmlns:p="http://schemas.openxmlformats.org/presentationml/2006/main">
   <p:cSld>
     <p:spTree>
@@ -7280,122 +7599,163 @@
           <a:lstStyle/>
           <a:p>
             <a:r>
+              <a:rPr lang="en-US" dirty="0"/>
+              <a:t>Strings in Switch Statements</a:t>
+            </a:r>
+          </a:p>
+        </p:txBody>
+      </p:sp>
+      <p:sp>
+        <p:nvSpPr>
+          <p:cNvPr id="3" name="Content Placeholder 2"/>
+          <p:cNvSpPr>
+            <a:spLocks noGrp="1"/>
+          </p:cNvSpPr>
+          <p:nvPr>
+            <p:ph idx="1"/>
+          </p:nvPr>
+        </p:nvSpPr>
+        <p:spPr/>
+        <p:txBody>
+          <a:bodyPr>
+            <a:normAutofit lnSpcReduction="10000"/>
+          </a:bodyPr>
+          <a:lstStyle/>
+          <a:p>
+            <a:pPr marL="0" indent="0">
+              <a:buNone/>
+            </a:pPr>
+            <a:r>
+              <a:rPr lang="en-US" dirty="0"/>
+              <a:t>System.out.println(“Enter shape”);</a:t>
+            </a:r>
+          </a:p>
+          <a:p>
+            <a:pPr marL="0" indent="0">
+              <a:buNone/>
+            </a:pPr>
+            <a:r>
+              <a:rPr lang="en-US" dirty="0"/>
+              <a:t>String sh=</a:t>
+            </a:r>
+            <a:r>
+              <a:rPr lang="en-US" dirty="0" err="1"/>
+              <a:t>sc.next</a:t>
+            </a:r>
+            <a:r>
+              <a:rPr lang="en-US" dirty="0"/>
+              <a:t>();</a:t>
+            </a:r>
+          </a:p>
+          <a:p>
+            <a:pPr marL="0" indent="0">
+              <a:buNone/>
+            </a:pPr>
+            <a:r>
               <a:rPr lang="en-US" dirty="0" smtClean="0"/>
-              <a:t>Example</a:t>
+              <a:t>if (</a:t>
+            </a:r>
+            <a:r>
+              <a:rPr lang="en-US" dirty="0" err="1" smtClean="0"/>
+              <a:t>sh.equalsIgnoreCase</a:t>
+            </a:r>
+            <a:r>
+              <a:rPr lang="en-US" dirty="0" smtClean="0"/>
+              <a:t>(“triangle”)</a:t>
+            </a:r>
+          </a:p>
+          <a:p>
+            <a:pPr marL="0" indent="0">
+              <a:buNone/>
+            </a:pPr>
+            <a:r>
+              <a:rPr lang="en-US" dirty="0" smtClean="0"/>
+              <a:t>{</a:t>
+            </a:r>
+          </a:p>
+          <a:p>
+            <a:pPr marL="0" indent="0">
+              <a:buNone/>
+            </a:pPr>
+            <a:r>
+              <a:rPr lang="en-US" dirty="0" smtClean="0"/>
+              <a:t>	System.out.println</a:t>
+            </a:r>
+            <a:r>
+              <a:rPr lang="en-US" dirty="0"/>
+              <a:t>(“3 sides</a:t>
+            </a:r>
+            <a:r>
+              <a:rPr lang="en-US" dirty="0" smtClean="0"/>
+              <a:t>”);</a:t>
+            </a:r>
+          </a:p>
+          <a:p>
+            <a:pPr marL="0" indent="0">
+              <a:buNone/>
+            </a:pPr>
+            <a:r>
+              <a:rPr lang="en-US" dirty="0" smtClean="0"/>
+              <a:t>}</a:t>
             </a:r>
             <a:endParaRPr lang="en-US" dirty="0"/>
           </a:p>
-        </p:txBody>
-      </p:sp>
-      <p:sp>
-        <p:nvSpPr>
-          <p:cNvPr id="3" name="Content Placeholder 2"/>
-          <p:cNvSpPr>
-            <a:spLocks noGrp="1"/>
-          </p:cNvSpPr>
-          <p:nvPr>
-            <p:ph idx="1"/>
-          </p:nvPr>
-        </p:nvSpPr>
-        <p:spPr/>
-        <p:txBody>
-          <a:bodyPr/>
-          <a:lstStyle/>
-          <a:p>
+          <a:p>
+            <a:pPr marL="0" indent="0">
+              <a:buNone/>
+            </a:pPr>
+            <a:r>
+              <a:rPr lang="en-US" dirty="0" smtClean="0"/>
+              <a:t>else if (</a:t>
+            </a:r>
             <a:r>
               <a:rPr lang="en-US" dirty="0" err="1" smtClean="0"/>
-              <a:t>System.out.println</a:t>
+              <a:t>sh.equalsIgnoreCase</a:t>
             </a:r>
             <a:r>
               <a:rPr lang="en-US" dirty="0" smtClean="0"/>
-              <a:t>(“Enter shape”)</a:t>
-            </a:r>
-          </a:p>
-          <a:p>
+              <a:t>(“square”)</a:t>
+            </a:r>
+          </a:p>
+          <a:p>
+            <a:pPr marL="0" indent="0">
+              <a:buNone/>
+            </a:pPr>
             <a:r>
               <a:rPr lang="en-US" dirty="0" smtClean="0"/>
-              <a:t>String </a:t>
-            </a:r>
-            <a:r>
-              <a:rPr lang="en-US" dirty="0" err="1" smtClean="0"/>
-              <a:t>sh</a:t>
-            </a:r>
+              <a:t>{</a:t>
+            </a:r>
+          </a:p>
+          <a:p>
+            <a:pPr marL="0" indent="0">
+              <a:buNone/>
+            </a:pPr>
             <a:r>
               <a:rPr lang="en-US" dirty="0" smtClean="0"/>
-              <a:t>=</a:t>
-            </a:r>
-            <a:r>
-              <a:rPr lang="en-US" dirty="0" err="1" smtClean="0"/>
-              <a:t>sc.next</a:t>
+              <a:t>	System.out.println</a:t>
+            </a:r>
+            <a:r>
+              <a:rPr lang="en-US" dirty="0"/>
+              <a:t>(“4 sides</a:t>
             </a:r>
             <a:r>
               <a:rPr lang="en-US" dirty="0" smtClean="0"/>
-              <a:t>()</a:t>
-            </a:r>
-          </a:p>
-          <a:p>
-            <a:r>
-              <a:rPr lang="en-US" dirty="0" smtClean="0"/>
-              <a:t>switch (</a:t>
-            </a:r>
-            <a:r>
-              <a:rPr lang="en-US" dirty="0" err="1" smtClean="0"/>
-              <a:t>sh</a:t>
-            </a:r>
-            <a:r>
-              <a:rPr lang="en-US" dirty="0" smtClean="0"/>
-              <a:t>)</a:t>
-            </a:r>
-          </a:p>
-          <a:p>
-            <a:pPr lvl="1"/>
-            <a:r>
-              <a:rPr lang="en-US" dirty="0" smtClean="0"/>
-              <a:t>case “triangle”</a:t>
-            </a:r>
-          </a:p>
-          <a:p>
-            <a:pPr lvl="2"/>
-            <a:r>
-              <a:rPr lang="en-US" dirty="0" err="1" smtClean="0"/>
-              <a:t>System.out.println</a:t>
-            </a:r>
-            <a:r>
-              <a:rPr lang="en-US" dirty="0" smtClean="0"/>
-              <a:t>(“3 sides”)</a:t>
-            </a:r>
-          </a:p>
-          <a:p>
-            <a:pPr lvl="2"/>
-            <a:r>
-              <a:rPr lang="en-US" dirty="0" smtClean="0"/>
-              <a:t>break;</a:t>
-            </a:r>
-          </a:p>
-          <a:p>
-            <a:pPr lvl="1"/>
-            <a:r>
-              <a:rPr lang="en-US" dirty="0" smtClean="0"/>
-              <a:t>case “square”</a:t>
-            </a:r>
-          </a:p>
-          <a:p>
-            <a:pPr lvl="2"/>
-            <a:r>
-              <a:rPr lang="en-US" dirty="0" err="1" smtClean="0"/>
-              <a:t>System.out.println</a:t>
-            </a:r>
-            <a:r>
-              <a:rPr lang="en-US" dirty="0" smtClean="0"/>
-              <a:t>(“4 sides”)</a:t>
-            </a:r>
-          </a:p>
-          <a:p>
-            <a:pPr lvl="2"/>
-            <a:r>
-              <a:rPr lang="en-US" smtClean="0"/>
-              <a:t>break;</a:t>
-            </a:r>
+              <a:t>”);</a:t>
+            </a:r>
+          </a:p>
+          <a:p>
+            <a:pPr marL="0" indent="0">
+              <a:buNone/>
+            </a:pPr>
+            <a:r>
+              <a:rPr lang="en-US" dirty="0"/>
+              <a:t>}</a:t>
+            </a:r>
+          </a:p>
+          <a:p>
+            <a:pPr marL="0" indent="0">
+              <a:buNone/>
+            </a:pPr>
             <a:endParaRPr lang="en-US" dirty="0"/>
           </a:p>
         </p:txBody>
@@ -7403,7 +7763,7 @@
     </p:spTree>
     <p:extLst>
       <p:ext uri="{BB962C8B-B14F-4D97-AF65-F5344CB8AC3E}">
-        <p14:creationId xmlns:p14="http://schemas.microsoft.com/office/powerpoint/2010/main" val="3559134665"/>
+        <p14:creationId xmlns:p14="http://schemas.microsoft.com/office/powerpoint/2010/main" val="344559689"/>
       </p:ext>
     </p:extLst>
   </p:cSld>
@@ -7453,50 +7813,77 @@
           <a:lstStyle/>
           <a:p>
             <a:r>
+              <a:rPr lang="en-US" dirty="0"/>
+              <a:t>Strings in Switch Statements</a:t>
+            </a:r>
+            <a:endParaRPr lang="en-US" dirty="0"/>
+          </a:p>
+        </p:txBody>
+      </p:sp>
+      <p:sp>
+        <p:nvSpPr>
+          <p:cNvPr id="3" name="Content Placeholder 2"/>
+          <p:cNvSpPr>
+            <a:spLocks noGrp="1"/>
+          </p:cNvSpPr>
+          <p:nvPr>
+            <p:ph idx="1"/>
+          </p:nvPr>
+        </p:nvSpPr>
+        <p:spPr/>
+        <p:txBody>
+          <a:bodyPr>
+            <a:normAutofit lnSpcReduction="10000"/>
+          </a:bodyPr>
+          <a:lstStyle/>
+          <a:p>
+            <a:pPr marL="0" indent="0">
+              <a:buNone/>
+            </a:pPr>
+            <a:r>
+              <a:rPr lang="en-US" dirty="0"/>
+              <a:t>System.out.println(“Enter shape</a:t>
+            </a:r>
+            <a:r>
               <a:rPr lang="en-US" dirty="0" smtClean="0"/>
-              <a:t>Handling Multiple Exception Types</a:t>
+              <a:t>”);</a:t>
             </a:r>
             <a:endParaRPr lang="en-US" dirty="0"/>
           </a:p>
-        </p:txBody>
-      </p:sp>
-      <p:sp>
-        <p:nvSpPr>
-          <p:cNvPr id="3" name="Content Placeholder 2"/>
-          <p:cNvSpPr>
-            <a:spLocks noGrp="1"/>
-          </p:cNvSpPr>
-          <p:nvPr>
-            <p:ph idx="1"/>
-          </p:nvPr>
-        </p:nvSpPr>
-        <p:spPr/>
-        <p:txBody>
-          <a:bodyPr>
-            <a:normAutofit fontScale="92500" lnSpcReduction="20000"/>
-          </a:bodyPr>
-          <a:lstStyle/>
-          <a:p>
+          <a:p>
+            <a:pPr marL="0" indent="0">
+              <a:buNone/>
+            </a:pPr>
+            <a:r>
+              <a:rPr lang="en-US" dirty="0"/>
+              <a:t>String sh=</a:t>
+            </a:r>
+            <a:r>
+              <a:rPr lang="en-US" dirty="0" err="1"/>
+              <a:t>sc.next</a:t>
+            </a:r>
             <a:r>
               <a:rPr lang="en-US" dirty="0" smtClean="0"/>
-              <a:t>Before Java 7 catch blocks had to be written like:</a:t>
-            </a:r>
+              <a:t>();</a:t>
+            </a:r>
+            <a:endParaRPr lang="en-US" dirty="0"/>
           </a:p>
           <a:p>
             <a:pPr marL="0" indent="0">
               <a:buNone/>
             </a:pPr>
-            <a:endParaRPr lang="en-US" dirty="0"/>
-          </a:p>
-          <a:p>
-            <a:pPr marL="0" indent="0">
-              <a:buNone/>
-            </a:pPr>
             <a:r>
               <a:rPr lang="en-US" dirty="0"/>
-              <a:t>catch (IOException ex) </a:t>
-            </a:r>
-            <a:endParaRPr lang="en-US" dirty="0" smtClean="0"/>
+              <a:t>switch (</a:t>
+            </a:r>
+            <a:r>
+              <a:rPr lang="en-US" dirty="0" err="1" smtClean="0"/>
+              <a:t>sh.toLowerCase</a:t>
+            </a:r>
+            <a:r>
+              <a:rPr lang="en-US" dirty="0" smtClean="0"/>
+              <a:t>()) </a:t>
+            </a:r>
           </a:p>
           <a:p>
             <a:pPr marL="0" indent="0">
@@ -7509,82 +7896,113 @@
             <a:endParaRPr lang="en-US" dirty="0"/>
           </a:p>
           <a:p>
+            <a:pPr marL="457200" lvl="1" indent="0">
+              <a:buNone/>
+            </a:pPr>
+            <a:r>
+              <a:rPr lang="en-US" dirty="0"/>
+              <a:t>case “triangle</a:t>
+            </a:r>
+            <a:r>
+              <a:rPr lang="en-US" dirty="0" smtClean="0"/>
+              <a:t>”:</a:t>
+            </a:r>
+            <a:endParaRPr lang="en-US" dirty="0"/>
+          </a:p>
+          <a:p>
+            <a:pPr marL="914400" lvl="2" indent="0">
+              <a:buNone/>
+            </a:pPr>
+            <a:r>
+              <a:rPr lang="en-US" dirty="0"/>
+              <a:t>System.out.println(“3 sides</a:t>
+            </a:r>
+            <a:r>
+              <a:rPr lang="en-US" dirty="0" smtClean="0"/>
+              <a:t>”);</a:t>
+            </a:r>
+            <a:endParaRPr lang="en-US" dirty="0"/>
+          </a:p>
+          <a:p>
+            <a:pPr marL="914400" lvl="2" indent="0">
+              <a:buNone/>
+            </a:pPr>
+            <a:r>
+              <a:rPr lang="en-US" dirty="0"/>
+              <a:t>break;</a:t>
+            </a:r>
+          </a:p>
+          <a:p>
+            <a:pPr marL="457200" lvl="1" indent="0">
+              <a:buNone/>
+            </a:pPr>
+            <a:r>
+              <a:rPr lang="en-US" dirty="0"/>
+              <a:t>case “square</a:t>
+            </a:r>
+            <a:r>
+              <a:rPr lang="en-US" dirty="0" smtClean="0"/>
+              <a:t>”:</a:t>
+            </a:r>
+            <a:endParaRPr lang="en-US" dirty="0"/>
+          </a:p>
+          <a:p>
+            <a:pPr marL="914400" lvl="2" indent="0">
+              <a:buNone/>
+            </a:pPr>
+            <a:r>
+              <a:rPr lang="en-US" dirty="0"/>
+              <a:t>System.out.println(“4 sides</a:t>
+            </a:r>
+            <a:r>
+              <a:rPr lang="en-US" dirty="0" smtClean="0"/>
+              <a:t>”);</a:t>
+            </a:r>
+            <a:endParaRPr lang="en-US" dirty="0"/>
+          </a:p>
+          <a:p>
+            <a:pPr marL="914400" lvl="2" indent="0">
+              <a:buNone/>
+            </a:pPr>
+            <a:r>
+              <a:rPr lang="en-US" dirty="0"/>
+              <a:t>break</a:t>
+            </a:r>
+            <a:r>
+              <a:rPr lang="en-US" dirty="0" smtClean="0"/>
+              <a:t>;</a:t>
+            </a:r>
+            <a:endParaRPr lang="en-US" dirty="0"/>
+          </a:p>
+          <a:p>
             <a:pPr marL="0" indent="0">
               <a:buNone/>
             </a:pPr>
             <a:r>
-              <a:rPr lang="en-US" dirty="0"/>
-              <a:t>     logger.log(ex);</a:t>
-            </a:r>
-          </a:p>
-          <a:p>
-            <a:pPr marL="0" indent="0">
-              <a:buNone/>
-            </a:pPr>
-            <a:r>
-              <a:rPr lang="en-US" dirty="0"/>
-              <a:t>     throw ex;</a:t>
-            </a:r>
-          </a:p>
-          <a:p>
-            <a:pPr marL="0" indent="0">
-              <a:buNone/>
-            </a:pPr>
-            <a:r>
-              <a:rPr lang="en-US" dirty="0"/>
-              <a:t>catch (SQLException ex) </a:t>
-            </a:r>
-            <a:endParaRPr lang="en-US" dirty="0" smtClean="0"/>
-          </a:p>
-          <a:p>
-            <a:pPr marL="0" indent="0">
-              <a:buNone/>
-            </a:pPr>
-            <a:r>
               <a:rPr lang="en-US" dirty="0" smtClean="0"/>
-              <a:t>{</a:t>
+              <a:t>}</a:t>
             </a:r>
             <a:endParaRPr lang="en-US" dirty="0"/>
-          </a:p>
-          <a:p>
-            <a:pPr marL="0" indent="0">
-              <a:buNone/>
-            </a:pPr>
-            <a:r>
-              <a:rPr lang="en-US" dirty="0"/>
-              <a:t>     logger.log(ex);</a:t>
-            </a:r>
-          </a:p>
-          <a:p>
-            <a:pPr marL="0" indent="0">
-              <a:buNone/>
-            </a:pPr>
-            <a:r>
-              <a:rPr lang="en-US" dirty="0"/>
-              <a:t>     throw ex;</a:t>
-            </a:r>
-          </a:p>
-          <a:p>
-            <a:pPr marL="0" indent="0">
-              <a:buNone/>
-            </a:pPr>
-            <a:r>
-              <a:rPr lang="en-US" dirty="0"/>
-              <a:t>}</a:t>
-            </a:r>
           </a:p>
         </p:txBody>
       </p:sp>
     </p:spTree>
     <p:extLst>
       <p:ext uri="{BB962C8B-B14F-4D97-AF65-F5344CB8AC3E}">
-        <p14:creationId xmlns:p14="http://schemas.microsoft.com/office/powerpoint/2010/main" val="4114222297"/>
+        <p14:creationId xmlns:p14="http://schemas.microsoft.com/office/powerpoint/2010/main" val="3559134665"/>
       </p:ext>
     </p:extLst>
   </p:cSld>
   <p:clrMapOvr>
     <a:masterClrMapping/>
   </p:clrMapOvr>
+  <p:timing>
+    <p:tnLst>
+      <p:par>
+        <p:cTn id="1" dur="indefinite" restart="never" nodeType="tmRoot"/>
+      </p:par>
+    </p:tnLst>
+  </p:timing>
 </p:sld>
 </file>
 
@@ -7621,31 +8039,50 @@
           <a:lstStyle/>
           <a:p>
             <a:r>
+              <a:rPr lang="en-US" dirty="0"/>
+              <a:t>Strings in Switch Statements</a:t>
+            </a:r>
+          </a:p>
+        </p:txBody>
+      </p:sp>
+      <p:sp>
+        <p:nvSpPr>
+          <p:cNvPr id="3" name="Content Placeholder 2"/>
+          <p:cNvSpPr>
+            <a:spLocks noGrp="1"/>
+          </p:cNvSpPr>
+          <p:nvPr>
+            <p:ph idx="1"/>
+          </p:nvPr>
+        </p:nvSpPr>
+        <p:spPr/>
+        <p:txBody>
+          <a:bodyPr/>
+          <a:lstStyle/>
+          <a:p>
+            <a:r>
               <a:rPr lang="en-US" dirty="0" smtClean="0"/>
-              <a:t>Handling Multiple Exception Types</a:t>
-            </a:r>
-            <a:endParaRPr lang="en-US" dirty="0"/>
-          </a:p>
-        </p:txBody>
-      </p:sp>
-      <p:sp>
-        <p:nvSpPr>
-          <p:cNvPr id="3" name="Content Placeholder 2"/>
-          <p:cNvSpPr>
-            <a:spLocks noGrp="1"/>
-          </p:cNvSpPr>
-          <p:nvPr>
-            <p:ph idx="1"/>
-          </p:nvPr>
-        </p:nvSpPr>
-        <p:spPr/>
-        <p:txBody>
-          <a:bodyPr/>
-          <a:lstStyle/>
+              <a:t>Why does this matter?</a:t>
+            </a:r>
+          </a:p>
+          <a:p>
+            <a:pPr marL="0" indent="0">
+              <a:buNone/>
+            </a:pPr>
+            <a:endParaRPr lang="en-US" dirty="0" smtClean="0"/>
+          </a:p>
           <a:p>
             <a:r>
               <a:rPr lang="en-US" dirty="0" smtClean="0"/>
-              <a:t>New in Java 7 is the capability to write catch blocks that look like:</a:t>
+              <a:t>“</a:t>
+            </a:r>
+            <a:r>
+              <a:rPr lang="en-US" dirty="0"/>
+              <a:t>The Java compiler generates generally more efficient bytecode from switch statements that use String objects than from chained if-then-else statements</a:t>
+            </a:r>
+            <a:r>
+              <a:rPr lang="en-US" dirty="0" smtClean="0"/>
+              <a:t>.”</a:t>
             </a:r>
           </a:p>
           <a:p>
@@ -7659,60 +8096,30 @@
               <a:buNone/>
             </a:pPr>
             <a:r>
-              <a:rPr lang="en-US" dirty="0"/>
-              <a:t>catch (IOException|SQLException ex) </a:t>
-            </a:r>
-            <a:endParaRPr lang="en-US" dirty="0" smtClean="0"/>
-          </a:p>
-          <a:p>
-            <a:pPr marL="0" indent="0">
-              <a:buNone/>
-            </a:pPr>
-            <a:r>
               <a:rPr lang="en-US" dirty="0" smtClean="0"/>
-              <a:t>{</a:t>
+              <a:t>												- oracle.com</a:t>
             </a:r>
             <a:endParaRPr lang="en-US" dirty="0"/>
-          </a:p>
-          <a:p>
-            <a:pPr marL="0" indent="0">
-              <a:buNone/>
-            </a:pPr>
-            <a:r>
-              <a:rPr lang="en-US" dirty="0"/>
-              <a:t>    logger.log(ex);</a:t>
-            </a:r>
-          </a:p>
-          <a:p>
-            <a:pPr marL="0" indent="0">
-              <a:buNone/>
-            </a:pPr>
-            <a:r>
-              <a:rPr lang="en-US" dirty="0"/>
-              <a:t>    throw ex;</a:t>
-            </a:r>
-          </a:p>
-          <a:p>
-            <a:pPr marL="0" indent="0">
-              <a:buNone/>
-            </a:pPr>
-            <a:r>
-              <a:rPr lang="en-US" dirty="0"/>
-              <a:t>}</a:t>
-            </a:r>
           </a:p>
         </p:txBody>
       </p:sp>
     </p:spTree>
     <p:extLst>
       <p:ext uri="{BB962C8B-B14F-4D97-AF65-F5344CB8AC3E}">
-        <p14:creationId xmlns:p14="http://schemas.microsoft.com/office/powerpoint/2010/main" val="1929767007"/>
+        <p14:creationId xmlns:p14="http://schemas.microsoft.com/office/powerpoint/2010/main" val="2471745375"/>
       </p:ext>
     </p:extLst>
   </p:cSld>
   <p:clrMapOvr>
     <a:masterClrMapping/>
   </p:clrMapOvr>
+  <p:timing>
+    <p:tnLst>
+      <p:par>
+        <p:cTn id="1" dur="indefinite" restart="never" nodeType="tmRoot"/>
+      </p:par>
+    </p:tnLst>
+  </p:timing>
 </p:sld>
 </file>
 

</xml_diff>